<commit_message>
Präsentation - fehlt noch KI + Kollision
</commit_message>
<xml_diff>
--- a/Präsentation/Jump And Run.pptx
+++ b/Präsentation/Jump And Run.pptx
@@ -7,14 +7,16 @@
   <p:sldIdLst>
     <p:sldId id="256" r:id="rId2"/>
     <p:sldId id="257" r:id="rId3"/>
-    <p:sldId id="265" r:id="rId4"/>
-    <p:sldId id="258" r:id="rId5"/>
-    <p:sldId id="259" r:id="rId6"/>
-    <p:sldId id="262" r:id="rId7"/>
-    <p:sldId id="260" r:id="rId8"/>
-    <p:sldId id="261" r:id="rId9"/>
-    <p:sldId id="263" r:id="rId10"/>
+    <p:sldId id="259" r:id="rId4"/>
+    <p:sldId id="265" r:id="rId5"/>
+    <p:sldId id="262" r:id="rId6"/>
+    <p:sldId id="260" r:id="rId7"/>
+    <p:sldId id="263" r:id="rId8"/>
+    <p:sldId id="267" r:id="rId9"/>
+    <p:sldId id="261" r:id="rId10"/>
     <p:sldId id="264" r:id="rId11"/>
+    <p:sldId id="258" r:id="rId12"/>
+    <p:sldId id="266" r:id="rId13"/>
   </p:sldIdLst>
   <p:sldSz cx="9144000" cy="6858000" type="screen4x3"/>
   <p:notesSz cx="6858000" cy="9144000"/>
@@ -3711,6 +3713,13 @@
   <p:clrMapOvr>
     <a:masterClrMapping/>
   </p:clrMapOvr>
+  <p:timing>
+    <p:tnLst>
+      <p:par>
+        <p:cTn id="1" dur="indefinite" restart="never" nodeType="tmRoot"/>
+      </p:par>
+    </p:tnLst>
+  </p:timing>
 </p:sld>
 </file>
 
@@ -3769,7 +3778,7 @@
           <a:bodyPr/>
           <a:lstStyle/>
           <a:p>
-            <a:endParaRPr lang="de-AT"/>
+            <a:endParaRPr lang="de-AT" dirty="0"/>
           </a:p>
         </p:txBody>
       </p:sp>
@@ -3778,6 +3787,212 @@
   <p:clrMapOvr>
     <a:masterClrMapping/>
   </p:clrMapOvr>
+  <p:timing>
+    <p:tnLst>
+      <p:par>
+        <p:cTn id="1" dur="indefinite" restart="never" nodeType="tmRoot"/>
+      </p:par>
+    </p:tnLst>
+  </p:timing>
+</p:sld>
+</file>
+
+<file path=ppt/slides/slide11.xml><?xml version="1.0" encoding="utf-8"?>
+<p:sld xmlns:a="http://schemas.openxmlformats.org/drawingml/2006/main" xmlns:r="http://schemas.openxmlformats.org/officeDocument/2006/relationships" xmlns:p="http://schemas.openxmlformats.org/presentationml/2006/main">
+  <p:cSld>
+    <p:spTree>
+      <p:nvGrpSpPr>
+        <p:cNvPr id="1" name=""/>
+        <p:cNvGrpSpPr/>
+        <p:nvPr/>
+      </p:nvGrpSpPr>
+      <p:grpSpPr>
+        <a:xfrm>
+          <a:off x="0" y="0"/>
+          <a:ext cx="0" cy="0"/>
+          <a:chOff x="0" y="0"/>
+          <a:chExt cx="0" cy="0"/>
+        </a:xfrm>
+      </p:grpSpPr>
+      <p:sp>
+        <p:nvSpPr>
+          <p:cNvPr id="2" name="Titel 1"/>
+          <p:cNvSpPr>
+            <a:spLocks noGrp="1"/>
+          </p:cNvSpPr>
+          <p:nvPr>
+            <p:ph type="title"/>
+          </p:nvPr>
+        </p:nvSpPr>
+        <p:spPr/>
+        <p:txBody>
+          <a:bodyPr/>
+          <a:lstStyle/>
+          <a:p>
+            <a:r>
+              <a:rPr lang="de-AT" dirty="0" err="1" smtClean="0"/>
+              <a:t>Kannkriterien</a:t>
+            </a:r>
+            <a:endParaRPr lang="de-AT" dirty="0"/>
+          </a:p>
+        </p:txBody>
+      </p:sp>
+      <p:sp>
+        <p:nvSpPr>
+          <p:cNvPr id="3" name="Inhaltsplatzhalter 2"/>
+          <p:cNvSpPr>
+            <a:spLocks noGrp="1"/>
+          </p:cNvSpPr>
+          <p:nvPr>
+            <p:ph idx="1"/>
+          </p:nvPr>
+        </p:nvSpPr>
+        <p:spPr/>
+        <p:txBody>
+          <a:bodyPr/>
+          <a:lstStyle/>
+          <a:p>
+            <a:r>
+              <a:rPr lang="de-AT" dirty="0" smtClean="0"/>
+              <a:t>Charakter soll schießen können(zielen mit der Maus ) </a:t>
+            </a:r>
+          </a:p>
+          <a:p>
+            <a:r>
+              <a:rPr lang="de-AT" dirty="0" smtClean="0"/>
+              <a:t>Spiel speichern</a:t>
+            </a:r>
+          </a:p>
+          <a:p>
+            <a:r>
+              <a:rPr lang="de-AT" dirty="0" err="1" smtClean="0"/>
+              <a:t>Highscore</a:t>
+            </a:r>
+            <a:r>
+              <a:rPr lang="de-AT" dirty="0" smtClean="0"/>
+              <a:t> anzeigen</a:t>
+            </a:r>
+          </a:p>
+          <a:p>
+            <a:r>
+              <a:rPr lang="de-AT" dirty="0" smtClean="0"/>
+              <a:t>Upgrades (schneller laufen, höher springen, mehr Leben usw.) </a:t>
+            </a:r>
+          </a:p>
+          <a:p>
+            <a:r>
+              <a:rPr lang="de-AT" dirty="0" smtClean="0"/>
+              <a:t>verschiedene Level </a:t>
+            </a:r>
+          </a:p>
+          <a:p>
+            <a:endParaRPr lang="de-AT" dirty="0"/>
+          </a:p>
+        </p:txBody>
+      </p:sp>
+    </p:spTree>
+  </p:cSld>
+  <p:clrMapOvr>
+    <a:masterClrMapping/>
+  </p:clrMapOvr>
+  <p:timing>
+    <p:tnLst>
+      <p:par>
+        <p:cTn id="1" dur="indefinite" restart="never" nodeType="tmRoot"/>
+      </p:par>
+    </p:tnLst>
+  </p:timing>
+</p:sld>
+</file>
+
+<file path=ppt/slides/slide12.xml><?xml version="1.0" encoding="utf-8"?>
+<p:sld xmlns:a="http://schemas.openxmlformats.org/drawingml/2006/main" xmlns:r="http://schemas.openxmlformats.org/officeDocument/2006/relationships" xmlns:p="http://schemas.openxmlformats.org/presentationml/2006/main">
+  <p:cSld>
+    <p:spTree>
+      <p:nvGrpSpPr>
+        <p:cNvPr id="1" name=""/>
+        <p:cNvGrpSpPr/>
+        <p:nvPr/>
+      </p:nvGrpSpPr>
+      <p:grpSpPr>
+        <a:xfrm>
+          <a:off x="0" y="0"/>
+          <a:ext cx="0" cy="0"/>
+          <a:chOff x="0" y="0"/>
+          <a:chExt cx="0" cy="0"/>
+        </a:xfrm>
+      </p:grpSpPr>
+      <p:sp>
+        <p:nvSpPr>
+          <p:cNvPr id="3" name="Inhaltsplatzhalter 2"/>
+          <p:cNvSpPr>
+            <a:spLocks noGrp="1"/>
+          </p:cNvSpPr>
+          <p:nvPr>
+            <p:ph idx="1"/>
+          </p:nvPr>
+        </p:nvSpPr>
+        <p:spPr>
+          <a:xfrm>
+            <a:off x="395536" y="332656"/>
+            <a:ext cx="8291264" cy="2260848"/>
+          </a:xfrm>
+        </p:spPr>
+        <p:txBody>
+          <a:bodyPr>
+            <a:noAutofit/>
+          </a:bodyPr>
+          <a:lstStyle/>
+          <a:p>
+            <a:pPr algn="ctr">
+              <a:buNone/>
+            </a:pPr>
+            <a:r>
+              <a:rPr lang="de-AT" sz="5000" dirty="0" smtClean="0"/>
+              <a:t>Vielen Dank für Ihre Aufmerksamkeit</a:t>
+            </a:r>
+            <a:endParaRPr lang="de-AT" sz="5000" dirty="0"/>
+          </a:p>
+        </p:txBody>
+      </p:sp>
+      <p:pic>
+        <p:nvPicPr>
+          <p:cNvPr id="3074" name="Picture 2" descr="C:\Users\Luki\Documents\GitHub\Jump_Run\Präsentation\Game.JPG"/>
+          <p:cNvPicPr>
+            <a:picLocks noChangeAspect="1" noChangeArrowheads="1"/>
+          </p:cNvPicPr>
+          <p:nvPr/>
+        </p:nvPicPr>
+        <p:blipFill>
+          <a:blip r:embed="rId2" cstate="print"/>
+          <a:srcRect/>
+          <a:stretch>
+            <a:fillRect/>
+          </a:stretch>
+        </p:blipFill>
+        <p:spPr bwMode="auto">
+          <a:xfrm>
+            <a:off x="1619672" y="2049052"/>
+            <a:ext cx="5976664" cy="4646598"/>
+          </a:xfrm>
+          <a:prstGeom prst="rect">
+            <a:avLst/>
+          </a:prstGeom>
+          <a:noFill/>
+        </p:spPr>
+      </p:pic>
+    </p:spTree>
+  </p:cSld>
+  <p:clrMapOvr>
+    <a:masterClrMapping/>
+  </p:clrMapOvr>
+  <p:timing>
+    <p:tnLst>
+      <p:par>
+        <p:cTn id="1" dur="indefinite" restart="never" nodeType="tmRoot"/>
+      </p:par>
+    </p:tnLst>
+  </p:timing>
 </p:sld>
 </file>
 
@@ -3877,6 +4092,13 @@
   <p:clrMapOvr>
     <a:masterClrMapping/>
   </p:clrMapOvr>
+  <p:timing>
+    <p:tnLst>
+      <p:par>
+        <p:cTn id="1" dur="indefinite" restart="never" nodeType="tmRoot"/>
+      </p:par>
+    </p:tnLst>
+  </p:timing>
 </p:sld>
 </file>
 
@@ -3914,7 +4136,7 @@
           <a:p>
             <a:r>
               <a:rPr lang="de-AT" dirty="0" smtClean="0"/>
-              <a:t>XNA</a:t>
+              <a:t>Produktumgebung</a:t>
             </a:r>
             <a:endParaRPr lang="de-AT" dirty="0"/>
           </a:p>
@@ -3936,58 +4158,21 @@
           <a:lstStyle/>
           <a:p>
             <a:r>
-              <a:rPr lang="de-AT" dirty="0" smtClean="0"/>
-              <a:t>Kapselt Funktionen von DirectX 9.0</a:t>
-            </a:r>
-            <a:endParaRPr lang="de-AT" dirty="0" smtClean="0"/>
-          </a:p>
-          <a:p>
-            <a:r>
-              <a:rPr lang="de-AT" dirty="0" smtClean="0"/>
-              <a:t>2D: </a:t>
-            </a:r>
-            <a:r>
-              <a:rPr lang="de-AT" dirty="0" err="1" smtClean="0"/>
-              <a:t>SpriteBatch</a:t>
-            </a:r>
-            <a:r>
-              <a:rPr lang="de-AT" dirty="0" smtClean="0"/>
-              <a:t>, </a:t>
-            </a:r>
-            <a:r>
-              <a:rPr lang="de-AT" dirty="0" err="1" smtClean="0"/>
-              <a:t>Texture</a:t>
-            </a:r>
-            <a:r>
-              <a:rPr lang="de-AT" dirty="0" smtClean="0"/>
-              <a:t>, </a:t>
-            </a:r>
-            <a:r>
-              <a:rPr lang="de-AT" dirty="0" err="1" smtClean="0"/>
-              <a:t>Rectangle</a:t>
-            </a:r>
-            <a:endParaRPr lang="de-AT" dirty="0"/>
-          </a:p>
-          <a:p>
-            <a:r>
-              <a:rPr lang="de-AT" dirty="0" smtClean="0"/>
-              <a:t>Kollision: </a:t>
-            </a:r>
-            <a:r>
-              <a:rPr lang="de-AT" dirty="0" err="1" smtClean="0"/>
-              <a:t>Rectangle</a:t>
-            </a:r>
-            <a:r>
-              <a:rPr lang="de-AT" dirty="0" smtClean="0"/>
-              <a:t>-Methoden</a:t>
-            </a:r>
-            <a:endParaRPr lang="de-AT" dirty="0" smtClean="0"/>
-          </a:p>
-          <a:p>
-            <a:pPr marL="36576" indent="0">
+              <a:rPr lang="nn-NO" dirty="0" smtClean="0"/>
+              <a:t>XNA – Game – Studio von Microsoft Visual Studio (NET Framework 4.0). </a:t>
+            </a:r>
+          </a:p>
+          <a:p>
+            <a:r>
+              <a:rPr lang="nn-NO" dirty="0" smtClean="0"/>
+              <a:t>Programmiersprache: C#</a:t>
+            </a:r>
+          </a:p>
+          <a:p>
+            <a:pPr>
               <a:buNone/>
             </a:pPr>
-            <a:endParaRPr lang="de-AT" dirty="0" smtClean="0"/>
+            <a:endParaRPr lang="de-AT" dirty="0"/>
           </a:p>
         </p:txBody>
       </p:sp>
@@ -3996,6 +4181,13 @@
   <p:clrMapOvr>
     <a:masterClrMapping/>
   </p:clrMapOvr>
+  <p:timing>
+    <p:tnLst>
+      <p:par>
+        <p:cTn id="1" dur="indefinite" restart="never" nodeType="tmRoot"/>
+      </p:par>
+    </p:tnLst>
+  </p:timing>
 </p:sld>
 </file>
 
@@ -4032,63 +4224,79 @@
           <a:lstStyle/>
           <a:p>
             <a:r>
+              <a:rPr lang="de-AT" dirty="0" smtClean="0"/>
+              <a:t>XNA</a:t>
+            </a:r>
+            <a:endParaRPr lang="de-AT" dirty="0"/>
+          </a:p>
+        </p:txBody>
+      </p:sp>
+      <p:sp>
+        <p:nvSpPr>
+          <p:cNvPr id="3" name="Inhaltsplatzhalter 2"/>
+          <p:cNvSpPr>
+            <a:spLocks noGrp="1"/>
+          </p:cNvSpPr>
+          <p:nvPr>
+            <p:ph idx="1"/>
+          </p:nvPr>
+        </p:nvSpPr>
+        <p:spPr/>
+        <p:txBody>
+          <a:bodyPr/>
+          <a:lstStyle/>
+          <a:p>
+            <a:r>
+              <a:rPr lang="de-AT" dirty="0" smtClean="0"/>
+              <a:t>Kapselt Funktionen von DirectX 9.0</a:t>
+            </a:r>
+          </a:p>
+          <a:p>
+            <a:r>
+              <a:rPr lang="de-AT" dirty="0" smtClean="0"/>
+              <a:t>2D: </a:t>
+            </a:r>
+            <a:r>
               <a:rPr lang="de-AT" dirty="0" err="1" smtClean="0"/>
-              <a:t>Kannkriterien</a:t>
+              <a:t>SpriteBatch</a:t>
+            </a:r>
+            <a:r>
+              <a:rPr lang="de-AT" dirty="0" smtClean="0"/>
+              <a:t>, </a:t>
+            </a:r>
+            <a:r>
+              <a:rPr lang="de-AT" dirty="0" err="1" smtClean="0"/>
+              <a:t>Texture</a:t>
+            </a:r>
+            <a:r>
+              <a:rPr lang="de-AT" dirty="0" smtClean="0"/>
+              <a:t>, </a:t>
+            </a:r>
+            <a:r>
+              <a:rPr lang="de-AT" dirty="0" err="1" smtClean="0"/>
+              <a:t>Rectangle</a:t>
             </a:r>
             <a:endParaRPr lang="de-AT" dirty="0"/>
           </a:p>
-        </p:txBody>
-      </p:sp>
-      <p:sp>
-        <p:nvSpPr>
-          <p:cNvPr id="3" name="Inhaltsplatzhalter 2"/>
-          <p:cNvSpPr>
-            <a:spLocks noGrp="1"/>
-          </p:cNvSpPr>
-          <p:nvPr>
-            <p:ph idx="1"/>
-          </p:nvPr>
-        </p:nvSpPr>
-        <p:spPr/>
-        <p:txBody>
-          <a:bodyPr/>
-          <a:lstStyle/>
           <a:p>
             <a:r>
               <a:rPr lang="de-AT" dirty="0" smtClean="0"/>
-              <a:t>Charakter soll schießen können(zielen mit der Maus ) </a:t>
-            </a:r>
-          </a:p>
-          <a:p>
+              <a:t>Kollision: </a:t>
+            </a:r>
+            <a:r>
+              <a:rPr lang="de-AT" dirty="0" err="1" smtClean="0"/>
+              <a:t>Rectangle</a:t>
+            </a:r>
             <a:r>
               <a:rPr lang="de-AT" dirty="0" smtClean="0"/>
-              <a:t>Spiel speichern</a:t>
-            </a:r>
-          </a:p>
-          <a:p>
-            <a:r>
-              <a:rPr lang="de-AT" dirty="0" err="1" smtClean="0"/>
-              <a:t>Highscore</a:t>
-            </a:r>
-            <a:r>
-              <a:rPr lang="de-AT" dirty="0" smtClean="0"/>
-              <a:t> anzeigen</a:t>
-            </a:r>
-          </a:p>
-          <a:p>
-            <a:r>
-              <a:rPr lang="de-AT" dirty="0" smtClean="0"/>
-              <a:t>Upgrades (schneller laufen, höher springen, mehr Leben usw.) </a:t>
-            </a:r>
-          </a:p>
-          <a:p>
-            <a:r>
-              <a:rPr lang="de-AT" dirty="0" smtClean="0"/>
-              <a:t>verschiedene Level </a:t>
-            </a:r>
-          </a:p>
-          <a:p>
-            <a:endParaRPr lang="de-AT" dirty="0"/>
+              <a:t>-Methoden</a:t>
+            </a:r>
+          </a:p>
+          <a:p>
+            <a:pPr marL="36576" indent="0">
+              <a:buNone/>
+            </a:pPr>
+            <a:endParaRPr lang="de-AT" dirty="0" smtClean="0"/>
           </a:p>
         </p:txBody>
       </p:sp>
@@ -4097,6 +4305,13 @@
   <p:clrMapOvr>
     <a:masterClrMapping/>
   </p:clrMapOvr>
+  <p:timing>
+    <p:tnLst>
+      <p:par>
+        <p:cTn id="1" dur="indefinite" restart="never" nodeType="tmRoot"/>
+      </p:par>
+    </p:tnLst>
+  </p:timing>
 </p:sld>
 </file>
 
@@ -4133,52 +4348,48 @@
           <a:lstStyle/>
           <a:p>
             <a:r>
-              <a:rPr lang="de-AT" dirty="0" err="1" smtClean="0"/>
-              <a:t>Produkumgebung</a:t>
+              <a:rPr lang="de-AT" dirty="0" smtClean="0"/>
+              <a:t>Klassenstruktur (Baum)</a:t>
             </a:r>
             <a:endParaRPr lang="de-AT" dirty="0"/>
           </a:p>
         </p:txBody>
       </p:sp>
-      <p:sp>
-        <p:nvSpPr>
-          <p:cNvPr id="3" name="Inhaltsplatzhalter 2"/>
-          <p:cNvSpPr>
-            <a:spLocks noGrp="1"/>
-          </p:cNvSpPr>
+      <p:pic>
+        <p:nvPicPr>
+          <p:cNvPr id="4" name="Inhaltsplatzhalter 3" descr="Klassendiagramm.png"/>
+          <p:cNvPicPr>
+            <a:picLocks noGrp="1" noChangeAspect="1"/>
+          </p:cNvPicPr>
           <p:nvPr>
             <p:ph idx="1"/>
           </p:nvPr>
-        </p:nvSpPr>
-        <p:spPr/>
-        <p:txBody>
-          <a:bodyPr/>
-          <a:lstStyle/>
-          <a:p>
-            <a:r>
-              <a:rPr lang="nn-NO" dirty="0" smtClean="0"/>
-              <a:t>XNA – Game – Studio von Microsoft Visual Studio (NET Framework 4.0). </a:t>
-            </a:r>
-          </a:p>
-          <a:p>
-            <a:r>
-              <a:rPr lang="nn-NO" dirty="0" smtClean="0"/>
-              <a:t>Programmiersprache: C#</a:t>
-            </a:r>
-          </a:p>
-          <a:p>
-            <a:pPr>
-              <a:buNone/>
-            </a:pPr>
-            <a:endParaRPr lang="de-AT" dirty="0"/>
-          </a:p>
-        </p:txBody>
-      </p:sp>
+        </p:nvPicPr>
+        <p:blipFill>
+          <a:blip r:embed="rId2" cstate="print"/>
+          <a:stretch>
+            <a:fillRect/>
+          </a:stretch>
+        </p:blipFill>
+        <p:spPr>
+          <a:xfrm>
+            <a:off x="1331640" y="1700808"/>
+            <a:ext cx="6617178" cy="4504855"/>
+          </a:xfrm>
+        </p:spPr>
+      </p:pic>
     </p:spTree>
   </p:cSld>
   <p:clrMapOvr>
     <a:masterClrMapping/>
   </p:clrMapOvr>
+  <p:timing>
+    <p:tnLst>
+      <p:par>
+        <p:cTn id="1" dur="indefinite" restart="never" nodeType="tmRoot"/>
+      </p:par>
+    </p:tnLst>
+  </p:timing>
 </p:sld>
 </file>
 
@@ -4216,7 +4427,7 @@
           <a:p>
             <a:r>
               <a:rPr lang="de-AT" dirty="0" smtClean="0"/>
-              <a:t>Klassenstruktur (Baum)</a:t>
+              <a:t>Animationen</a:t>
             </a:r>
             <a:endParaRPr lang="de-AT" dirty="0"/>
           </a:p>
@@ -4224,9 +4435,9 @@
       </p:sp>
       <p:pic>
         <p:nvPicPr>
-          <p:cNvPr id="4" name="Inhaltsplatzhalter 3" descr="Klassendiagramm.png"/>
+          <p:cNvPr id="2050" name="Picture 2" descr="C:\Users\Clemens\Desktop\Jump_Run\Game\Jump_n_Run\Jump_n_Run\Jump_n_RunContent\Images\gameobjects\Runv2.png"/>
           <p:cNvPicPr>
-            <a:picLocks noGrp="1" noChangeAspect="1"/>
+            <a:picLocks noGrp="1" noChangeAspect="1" noChangeArrowheads="1"/>
           </p:cNvPicPr>
           <p:nvPr>
             <p:ph idx="1"/>
@@ -4234,15 +4445,46 @@
         </p:nvPicPr>
         <p:blipFill>
           <a:blip r:embed="rId2" cstate="print"/>
+          <a:srcRect/>
           <a:stretch>
             <a:fillRect/>
           </a:stretch>
         </p:blipFill>
-        <p:spPr>
+        <p:spPr bwMode="auto">
           <a:xfrm>
-            <a:off x="1331640" y="1700808"/>
-            <a:ext cx="6617178" cy="4504855"/>
+            <a:off x="323528" y="1988840"/>
+            <a:ext cx="8408811" cy="904174"/>
           </a:xfrm>
+          <a:prstGeom prst="rect">
+            <a:avLst/>
+          </a:prstGeom>
+          <a:noFill/>
+        </p:spPr>
+      </p:pic>
+      <p:pic>
+        <p:nvPicPr>
+          <p:cNvPr id="1026" name="Picture 2" descr="C:\Users\Luki\Desktop\Run-Animation.JPG"/>
+          <p:cNvPicPr>
+            <a:picLocks noChangeAspect="1" noChangeArrowheads="1"/>
+          </p:cNvPicPr>
+          <p:nvPr/>
+        </p:nvPicPr>
+        <p:blipFill>
+          <a:blip r:embed="rId3" cstate="print"/>
+          <a:srcRect/>
+          <a:stretch>
+            <a:fillRect/>
+          </a:stretch>
+        </p:blipFill>
+        <p:spPr bwMode="auto">
+          <a:xfrm>
+            <a:off x="467544" y="3573016"/>
+            <a:ext cx="7879191" cy="1944216"/>
+          </a:xfrm>
+          <a:prstGeom prst="rect">
+            <a:avLst/>
+          </a:prstGeom>
+          <a:noFill/>
         </p:spPr>
       </p:pic>
     </p:spTree>
@@ -4250,6 +4492,13 @@
   <p:clrMapOvr>
     <a:masterClrMapping/>
   </p:clrMapOvr>
+  <p:timing>
+    <p:tnLst>
+      <p:par>
+        <p:cTn id="1" dur="indefinite" restart="never" nodeType="tmRoot"/>
+      </p:par>
+    </p:tnLst>
+  </p:timing>
 </p:sld>
 </file>
 
@@ -4287,69 +4536,28 @@
           <a:p>
             <a:r>
               <a:rPr lang="de-AT" dirty="0" smtClean="0"/>
-              <a:t>Animationen</a:t>
+              <a:t>Kollision</a:t>
             </a:r>
             <a:endParaRPr lang="de-AT" dirty="0"/>
           </a:p>
         </p:txBody>
       </p:sp>
-      <p:pic>
-        <p:nvPicPr>
-          <p:cNvPr id="2050" name="Picture 2" descr="C:\Users\Clemens\Desktop\Jump_Run\Game\Jump_n_Run\Jump_n_Run\Jump_n_RunContent\Images\gameobjects\Runv2.png"/>
-          <p:cNvPicPr>
-            <a:picLocks noGrp="1" noChangeAspect="1" noChangeArrowheads="1"/>
-          </p:cNvPicPr>
+      <p:sp>
+        <p:nvSpPr>
+          <p:cNvPr id="3" name="Inhaltsplatzhalter 2"/>
+          <p:cNvSpPr>
+            <a:spLocks noGrp="1"/>
+          </p:cNvSpPr>
           <p:nvPr>
             <p:ph idx="1"/>
           </p:nvPr>
-        </p:nvPicPr>
-        <p:blipFill>
-          <a:blip r:embed="rId2" cstate="print"/>
-          <a:srcRect/>
-          <a:stretch>
-            <a:fillRect/>
-          </a:stretch>
-        </p:blipFill>
-        <p:spPr bwMode="auto">
-          <a:xfrm>
-            <a:off x="323528" y="2204864"/>
-            <a:ext cx="8408811" cy="904174"/>
-          </a:xfrm>
-          <a:prstGeom prst="rect">
-            <a:avLst/>
-          </a:prstGeom>
-          <a:noFill/>
-        </p:spPr>
-      </p:pic>
-      <p:sp>
-        <p:nvSpPr>
-          <p:cNvPr id="5" name="Textfeld 4"/>
-          <p:cNvSpPr txBox="1"/>
-          <p:nvPr/>
-        </p:nvSpPr>
-        <p:spPr>
-          <a:xfrm>
-            <a:off x="1763688" y="3861048"/>
-            <a:ext cx="5688632" cy="646331"/>
-          </a:xfrm>
-          <a:prstGeom prst="rect">
-            <a:avLst/>
-          </a:prstGeom>
-          <a:noFill/>
-        </p:spPr>
-        <p:txBody>
-          <a:bodyPr wrap="square" rtlCol="0">
-            <a:spAutoFit/>
-          </a:bodyPr>
-          <a:lstStyle/>
-          <a:p>
-            <a:r>
-              <a:rPr lang="de-AT" dirty="0" smtClean="0"/>
-              <a:t>Erklärung!!!!</a:t>
-            </a:r>
-          </a:p>
-          <a:p>
-            <a:endParaRPr lang="de-AT" dirty="0"/>
+        </p:nvSpPr>
+        <p:spPr/>
+        <p:txBody>
+          <a:bodyPr/>
+          <a:lstStyle/>
+          <a:p>
+            <a:endParaRPr lang="de-AT"/>
           </a:p>
         </p:txBody>
       </p:sp>
@@ -4358,6 +4566,13 @@
   <p:clrMapOvr>
     <a:masterClrMapping/>
   </p:clrMapOvr>
+  <p:timing>
+    <p:tnLst>
+      <p:par>
+        <p:cTn id="1" dur="indefinite" restart="never" nodeType="tmRoot"/>
+      </p:par>
+    </p:tnLst>
+  </p:timing>
 </p:sld>
 </file>
 
@@ -4394,37 +4609,95 @@
           <a:lstStyle/>
           <a:p>
             <a:r>
+              <a:rPr lang="de-AT" dirty="0" err="1" smtClean="0"/>
+              <a:t>Sidescrolling</a:t>
+            </a:r>
+            <a:endParaRPr lang="de-AT" dirty="0"/>
+          </a:p>
+        </p:txBody>
+      </p:sp>
+      <p:sp>
+        <p:nvSpPr>
+          <p:cNvPr id="3" name="Inhaltsplatzhalter 2"/>
+          <p:cNvSpPr>
+            <a:spLocks noGrp="1"/>
+          </p:cNvSpPr>
+          <p:nvPr>
+            <p:ph idx="1"/>
+          </p:nvPr>
+        </p:nvSpPr>
+        <p:spPr/>
+        <p:txBody>
+          <a:bodyPr/>
+          <a:lstStyle/>
+          <a:p>
+            <a:r>
               <a:rPr lang="de-AT" dirty="0" smtClean="0"/>
-              <a:t>Items</a:t>
-            </a:r>
-            <a:endParaRPr lang="de-AT" dirty="0"/>
-          </a:p>
-        </p:txBody>
-      </p:sp>
-      <p:sp>
-        <p:nvSpPr>
-          <p:cNvPr id="3" name="Inhaltsplatzhalter 2"/>
-          <p:cNvSpPr>
-            <a:spLocks noGrp="1"/>
-          </p:cNvSpPr>
-          <p:nvPr>
-            <p:ph idx="1"/>
-          </p:nvPr>
-        </p:nvSpPr>
-        <p:spPr/>
-        <p:txBody>
-          <a:bodyPr/>
-          <a:lstStyle/>
-          <a:p>
-            <a:endParaRPr lang="de-AT" dirty="0"/>
-          </a:p>
-        </p:txBody>
-      </p:sp>
+              <a:t>Player </a:t>
+            </a:r>
+            <a:r>
+              <a:rPr lang="de-AT" dirty="0" err="1" smtClean="0"/>
+              <a:t>Rectangle</a:t>
+            </a:r>
+            <a:r>
+              <a:rPr lang="de-AT" dirty="0" smtClean="0"/>
+              <a:t> an bestimmter </a:t>
+            </a:r>
+            <a:r>
+              <a:rPr lang="de-AT" dirty="0" err="1" smtClean="0"/>
+              <a:t>Positon</a:t>
+            </a:r>
+            <a:r>
+              <a:rPr lang="de-AT" dirty="0" smtClean="0"/>
+              <a:t> =&gt; Hintergrund wird verschoben</a:t>
+            </a:r>
+          </a:p>
+          <a:p>
+            <a:pPr>
+              <a:buNone/>
+            </a:pPr>
+            <a:endParaRPr lang="de-AT" dirty="0" smtClean="0"/>
+          </a:p>
+        </p:txBody>
+      </p:sp>
+      <p:pic>
+        <p:nvPicPr>
+          <p:cNvPr id="4098" name="Picture 2" descr="C:\Users\Luki\Documents\GitHub\Jump_Run\Präsentation\Scrolling.JPG"/>
+          <p:cNvPicPr>
+            <a:picLocks noChangeAspect="1" noChangeArrowheads="1"/>
+          </p:cNvPicPr>
+          <p:nvPr/>
+        </p:nvPicPr>
+        <p:blipFill>
+          <a:blip r:embed="rId2" cstate="print"/>
+          <a:srcRect/>
+          <a:stretch>
+            <a:fillRect/>
+          </a:stretch>
+        </p:blipFill>
+        <p:spPr bwMode="auto">
+          <a:xfrm>
+            <a:off x="219486" y="3140968"/>
+            <a:ext cx="8838789" cy="2899792"/>
+          </a:xfrm>
+          <a:prstGeom prst="rect">
+            <a:avLst/>
+          </a:prstGeom>
+          <a:noFill/>
+        </p:spPr>
+      </p:pic>
     </p:spTree>
   </p:cSld>
   <p:clrMapOvr>
     <a:masterClrMapping/>
   </p:clrMapOvr>
+  <p:timing>
+    <p:tnLst>
+      <p:par>
+        <p:cTn id="1" dur="indefinite" restart="never" nodeType="tmRoot"/>
+      </p:par>
+    </p:tnLst>
+  </p:timing>
 </p:sld>
 </file>
 
@@ -4462,7 +4735,7 @@
           <a:p>
             <a:r>
               <a:rPr lang="de-AT" dirty="0" smtClean="0"/>
-              <a:t>Kollision</a:t>
+              <a:t>Items</a:t>
             </a:r>
             <a:endParaRPr lang="de-AT" dirty="0"/>
           </a:p>
@@ -4483,15 +4756,93 @@
           <a:bodyPr/>
           <a:lstStyle/>
           <a:p>
-            <a:endParaRPr lang="de-AT"/>
-          </a:p>
-        </p:txBody>
-      </p:sp>
+            <a:endParaRPr lang="de-AT" dirty="0" smtClean="0"/>
+          </a:p>
+          <a:p>
+            <a:endParaRPr lang="de-AT" dirty="0" smtClean="0"/>
+          </a:p>
+          <a:p>
+            <a:endParaRPr lang="de-AT" dirty="0" smtClean="0"/>
+          </a:p>
+          <a:p>
+            <a:endParaRPr lang="de-AT" dirty="0" smtClean="0"/>
+          </a:p>
+          <a:p>
+            <a:endParaRPr lang="de-AT" dirty="0" smtClean="0"/>
+          </a:p>
+          <a:p>
+            <a:endParaRPr lang="de-AT" dirty="0"/>
+          </a:p>
+          <a:p>
+            <a:pPr lvl="1"/>
+            <a:r>
+              <a:rPr lang="de-AT" dirty="0" err="1" smtClean="0"/>
+              <a:t>Konstruktoren</a:t>
+            </a:r>
+            <a:r>
+              <a:rPr lang="de-AT" dirty="0" smtClean="0"/>
+              <a:t> überschreiben</a:t>
+            </a:r>
+          </a:p>
+          <a:p>
+            <a:pPr lvl="1"/>
+            <a:r>
+              <a:rPr lang="de-AT" dirty="0" smtClean="0"/>
+              <a:t>Methode </a:t>
+            </a:r>
+            <a:r>
+              <a:rPr lang="de-AT" dirty="0" err="1" smtClean="0"/>
+              <a:t>ItemPickup</a:t>
+            </a:r>
+            <a:r>
+              <a:rPr lang="de-AT" dirty="0" smtClean="0"/>
+              <a:t> –&gt; Player</a:t>
+            </a:r>
+          </a:p>
+          <a:p>
+            <a:pPr lvl="1"/>
+            <a:endParaRPr lang="de-AT" dirty="0" smtClean="0"/>
+          </a:p>
+        </p:txBody>
+      </p:sp>
+      <p:pic>
+        <p:nvPicPr>
+          <p:cNvPr id="2050" name="Picture 2" descr="C:\Users\Luki\Documents\GitHub\Jump_Run\Präsentation\Item_UML.JPG"/>
+          <p:cNvPicPr>
+            <a:picLocks noChangeAspect="1" noChangeArrowheads="1"/>
+          </p:cNvPicPr>
+          <p:nvPr/>
+        </p:nvPicPr>
+        <p:blipFill>
+          <a:blip r:embed="rId2" cstate="print"/>
+          <a:srcRect l="6349" t="17918" r="11111" b="22357"/>
+          <a:stretch>
+            <a:fillRect/>
+          </a:stretch>
+        </p:blipFill>
+        <p:spPr bwMode="auto">
+          <a:xfrm>
+            <a:off x="899592" y="1844824"/>
+            <a:ext cx="6480720" cy="2492585"/>
+          </a:xfrm>
+          <a:prstGeom prst="rect">
+            <a:avLst/>
+          </a:prstGeom>
+          <a:noFill/>
+        </p:spPr>
+      </p:pic>
     </p:spTree>
   </p:cSld>
   <p:clrMapOvr>
     <a:masterClrMapping/>
   </p:clrMapOvr>
+  <p:timing>
+    <p:tnLst>
+      <p:par>
+        <p:cTn id="1" dur="indefinite" restart="never" nodeType="tmRoot"/>
+      </p:par>
+    </p:tnLst>
+  </p:timing>
 </p:sld>
 </file>
 

</xml_diff>

<commit_message>
präsentatiion - ki + kollision
</commit_message>
<xml_diff>
--- a/Präsentation/Jump And Run.pptx
+++ b/Präsentation/Jump And Run.pptx
@@ -3778,6 +3778,36 @@
           <a:bodyPr/>
           <a:lstStyle/>
           <a:p>
+            <a:r>
+              <a:rPr lang="de-AT" dirty="0" smtClean="0"/>
+              <a:t>Gegner bewegt sich per Zufall über den Bildschirm</a:t>
+            </a:r>
+          </a:p>
+          <a:p>
+            <a:r>
+              <a:rPr lang="de-AT" dirty="0" smtClean="0"/>
+              <a:t>Kann </a:t>
+            </a:r>
+          </a:p>
+          <a:p>
+            <a:pPr lvl="1"/>
+            <a:r>
+              <a:rPr lang="de-AT" dirty="0" smtClean="0"/>
+              <a:t>Nach links und rechts laufen</a:t>
+            </a:r>
+          </a:p>
+          <a:p>
+            <a:pPr lvl="1"/>
+            <a:r>
+              <a:rPr lang="de-AT" dirty="0" smtClean="0"/>
+              <a:t>springen</a:t>
+            </a:r>
+          </a:p>
+          <a:p>
+            <a:r>
+              <a:rPr lang="de-AT" dirty="0" smtClean="0"/>
+              <a:t>Test Gegner: Kung – Fu – Panda </a:t>
+            </a:r>
             <a:endParaRPr lang="de-AT" dirty="0"/>
           </a:p>
         </p:txBody>
@@ -3854,7 +3884,16 @@
           <a:p>
             <a:r>
               <a:rPr lang="de-AT" dirty="0" smtClean="0"/>
-              <a:t>Charakter soll schießen können(zielen mit der Maus ) </a:t>
+              <a:t>Charakter soll schießen können</a:t>
+            </a:r>
+          </a:p>
+          <a:p>
+            <a:pPr>
+              <a:buNone/>
+            </a:pPr>
+            <a:r>
+              <a:rPr lang="de-AT" dirty="0" smtClean="0"/>
+              <a:t>	(zielen mit der Maus) </a:t>
             </a:r>
           </a:p>
           <a:p>
@@ -4254,23 +4293,33 @@
           <a:p>
             <a:r>
               <a:rPr lang="de-AT" dirty="0" smtClean="0"/>
-              <a:t>2D: </a:t>
-            </a:r>
+              <a:t>2D </a:t>
+            </a:r>
+          </a:p>
+          <a:p>
+            <a:pPr lvl="1"/>
             <a:r>
               <a:rPr lang="de-AT" dirty="0" err="1" smtClean="0"/>
               <a:t>SpriteBatch</a:t>
             </a:r>
             <a:r>
               <a:rPr lang="de-AT" dirty="0" smtClean="0"/>
-              <a:t>, </a:t>
-            </a:r>
+              <a:t> </a:t>
+            </a:r>
+          </a:p>
+          <a:p>
+            <a:pPr lvl="1"/>
             <a:r>
               <a:rPr lang="de-AT" dirty="0" err="1" smtClean="0"/>
               <a:t>Texture</a:t>
             </a:r>
+            <a:endParaRPr lang="de-AT" dirty="0" smtClean="0"/>
+          </a:p>
+          <a:p>
+            <a:pPr lvl="1"/>
             <a:r>
               <a:rPr lang="de-AT" dirty="0" smtClean="0"/>
-              <a:t>, </a:t>
+              <a:t> </a:t>
             </a:r>
             <a:r>
               <a:rPr lang="de-AT" dirty="0" err="1" smtClean="0"/>
@@ -4557,7 +4606,21 @@
           <a:bodyPr/>
           <a:lstStyle/>
           <a:p>
-            <a:endParaRPr lang="de-AT"/>
+            <a:r>
+              <a:rPr lang="de-AT" dirty="0" smtClean="0"/>
+              <a:t>Jede Sekunde findet </a:t>
+            </a:r>
+            <a:r>
+              <a:rPr lang="de-AT" dirty="0" smtClean="0"/>
+              <a:t>Ü</a:t>
+            </a:r>
+            <a:r>
+              <a:rPr lang="de-AT" dirty="0" smtClean="0"/>
+              <a:t>berprüfung statt</a:t>
+            </a:r>
+          </a:p>
+          <a:p>
+            <a:endParaRPr lang="de-AT" dirty="0"/>
           </a:p>
         </p:txBody>
       </p:sp>
@@ -4796,7 +4859,7 @@
             </a:r>
             <a:r>
               <a:rPr lang="de-AT" dirty="0" smtClean="0"/>
-              <a:t> –&gt; Player</a:t>
+              <a:t> im Player</a:t>
             </a:r>
           </a:p>
           <a:p>

</xml_diff>